<commit_message>
revision for resubmission 08.11.16
</commit_message>
<xml_diff>
--- a/work/meetings/ppt presentations/MTC meeting slides August 01 2016.pptx
+++ b/work/meetings/ppt presentations/MTC meeting slides August 01 2016.pptx
@@ -6,19 +6,18 @@
     <p:sldMasterId id="2147483720" r:id="rId2"/>
   </p:sldMasterIdLst>
   <p:notesMasterIdLst>
-    <p:notesMasterId r:id="rId10"/>
+    <p:notesMasterId r:id="rId9"/>
   </p:notesMasterIdLst>
   <p:handoutMasterIdLst>
-    <p:handoutMasterId r:id="rId11"/>
+    <p:handoutMasterId r:id="rId10"/>
   </p:handoutMasterIdLst>
   <p:sldIdLst>
     <p:sldId id="405" r:id="rId3"/>
-    <p:sldId id="427" r:id="rId4"/>
-    <p:sldId id="480" r:id="rId5"/>
-    <p:sldId id="491" r:id="rId6"/>
-    <p:sldId id="493" r:id="rId7"/>
-    <p:sldId id="492" r:id="rId8"/>
-    <p:sldId id="494" r:id="rId9"/>
+    <p:sldId id="480" r:id="rId4"/>
+    <p:sldId id="491" r:id="rId5"/>
+    <p:sldId id="493" r:id="rId6"/>
+    <p:sldId id="492" r:id="rId7"/>
+    <p:sldId id="494" r:id="rId8"/>
   </p:sldIdLst>
   <p:sldSz cx="9144000" cy="6858000" type="screen4x3"/>
   <p:notesSz cx="7010400" cy="9296400"/>
@@ -232,7 +231,7 @@
           <a:p>
             <a:fld id="{FE327B58-3EB8-4C3D-867C-62DD8EF2CEFE}" type="datetimeFigureOut">
               <a:rPr lang="en-US" smtClean="0"/>
-              <a:t>7/30/2016</a:t>
+              <a:t>8/5/2016</a:t>
             </a:fld>
             <a:endParaRPr lang="en-US"/>
           </a:p>
@@ -398,7 +397,7 @@
           <a:p>
             <a:fld id="{99840059-61E0-4978-BB8C-C4A49FC0AFE3}" type="datetimeFigureOut">
               <a:rPr lang="en-US" smtClean="0"/>
-              <a:t>7/30/2016</a:t>
+              <a:t>8/5/2016</a:t>
             </a:fld>
             <a:endParaRPr lang="en-US"/>
           </a:p>
@@ -939,7 +938,7 @@
           <a:p>
             <a:fld id="{1868AD23-8996-4310-8FBA-43966A64AD45}" type="datetime1">
               <a:rPr lang="en-US" smtClean="0"/>
-              <a:t>7/30/2016</a:t>
+              <a:t>8/5/2016</a:t>
             </a:fld>
             <a:endParaRPr lang="en-US"/>
           </a:p>
@@ -1146,7 +1145,7 @@
           <a:p>
             <a:fld id="{DB32854A-FFAB-46C8-BE9F-32B8DF6521D5}" type="datetime1">
               <a:rPr lang="en-US" smtClean="0"/>
-              <a:t>7/30/2016</a:t>
+              <a:t>8/5/2016</a:t>
             </a:fld>
             <a:endParaRPr lang="en-US"/>
           </a:p>
@@ -1321,7 +1320,7 @@
           <a:p>
             <a:fld id="{4178C3E4-845B-4BF0-8EE6-77FC18ADDB17}" type="datetime1">
               <a:rPr lang="en-US" smtClean="0"/>
-              <a:t>7/30/2016</a:t>
+              <a:t>8/5/2016</a:t>
             </a:fld>
             <a:endParaRPr lang="en-US"/>
           </a:p>
@@ -1558,7 +1557,7 @@
           <a:p>
             <a:fld id="{13177990-F8EC-4697-8393-D77B07BF316A}" type="datetime1">
               <a:rPr lang="en-US" smtClean="0"/>
-              <a:t>7/30/2016</a:t>
+              <a:t>8/5/2016</a:t>
             </a:fld>
             <a:endParaRPr lang="en-US"/>
           </a:p>
@@ -1728,7 +1727,7 @@
           <a:p>
             <a:fld id="{9698FAC2-B662-4A1B-9205-FAB17ED04D96}" type="datetime1">
               <a:rPr lang="en-US" smtClean="0"/>
-              <a:t>7/30/2016</a:t>
+              <a:t>8/5/2016</a:t>
             </a:fld>
             <a:endParaRPr lang="en-US"/>
           </a:p>
@@ -1974,7 +1973,7 @@
           <a:p>
             <a:fld id="{8CD5A84D-4301-44BC-8BEA-E73A6CF64984}" type="datetime1">
               <a:rPr lang="en-US" smtClean="0"/>
-              <a:t>7/30/2016</a:t>
+              <a:t>8/5/2016</a:t>
             </a:fld>
             <a:endParaRPr lang="en-US"/>
           </a:p>
@@ -2262,7 +2261,7 @@
           <a:p>
             <a:fld id="{DDBEB79B-9C63-4405-B9FD-A8CD5ADB66E4}" type="datetime1">
               <a:rPr lang="en-US" smtClean="0"/>
-              <a:t>7/30/2016</a:t>
+              <a:t>8/5/2016</a:t>
             </a:fld>
             <a:endParaRPr lang="en-US"/>
           </a:p>
@@ -2684,7 +2683,7 @@
           <a:p>
             <a:fld id="{739C62FD-BE2A-445B-94D1-A5C06F20697F}" type="datetime1">
               <a:rPr lang="en-US" smtClean="0"/>
-              <a:t>7/30/2016</a:t>
+              <a:t>8/5/2016</a:t>
             </a:fld>
             <a:endParaRPr lang="en-US"/>
           </a:p>
@@ -2802,7 +2801,7 @@
           <a:p>
             <a:fld id="{97D15954-1400-4745-8F08-6F4BD6D76186}" type="datetime1">
               <a:rPr lang="en-US" smtClean="0"/>
-              <a:t>7/30/2016</a:t>
+              <a:t>8/5/2016</a:t>
             </a:fld>
             <a:endParaRPr lang="en-US"/>
           </a:p>
@@ -2897,7 +2896,7 @@
           <a:p>
             <a:fld id="{156FE5D5-1499-4127-B1FB-867F32CC8D33}" type="datetime1">
               <a:rPr lang="en-US" smtClean="0"/>
-              <a:t>7/30/2016</a:t>
+              <a:t>8/5/2016</a:t>
             </a:fld>
             <a:endParaRPr lang="en-US"/>
           </a:p>
@@ -3174,7 +3173,7 @@
           <a:p>
             <a:fld id="{FF7707B6-9F87-4198-A07C-8B481037673D}" type="datetime1">
               <a:rPr lang="en-US" smtClean="0"/>
-              <a:t>7/30/2016</a:t>
+              <a:t>8/5/2016</a:t>
             </a:fld>
             <a:endParaRPr lang="en-US"/>
           </a:p>
@@ -3352,7 +3351,7 @@
           <a:p>
             <a:fld id="{CCE08984-51A4-4F22-B6FE-4A364ABB3D6D}" type="datetime1">
               <a:rPr lang="en-US" smtClean="0"/>
-              <a:t>7/30/2016</a:t>
+              <a:t>8/5/2016</a:t>
             </a:fld>
             <a:endParaRPr lang="en-US" dirty="0"/>
           </a:p>
@@ -3691,7 +3690,7 @@
           <a:p>
             <a:fld id="{D243EF50-B6CF-4521-BA93-A2F67298A62D}" type="datetime1">
               <a:rPr lang="en-US" smtClean="0"/>
-              <a:t>7/30/2016</a:t>
+              <a:t>8/5/2016</a:t>
             </a:fld>
             <a:endParaRPr lang="en-US"/>
           </a:p>
@@ -3861,7 +3860,7 @@
           <a:p>
             <a:fld id="{8CEF2F5E-B589-4E99-AA1B-AD6D442AE0FD}" type="datetime1">
               <a:rPr lang="en-US" smtClean="0"/>
-              <a:t>7/30/2016</a:t>
+              <a:t>8/5/2016</a:t>
             </a:fld>
             <a:endParaRPr lang="en-US"/>
           </a:p>
@@ -4041,7 +4040,7 @@
           <a:p>
             <a:fld id="{77501995-8311-43FA-8AEF-B0217DDA0499}" type="datetime1">
               <a:rPr lang="en-US" smtClean="0"/>
-              <a:t>7/30/2016</a:t>
+              <a:t>8/5/2016</a:t>
             </a:fld>
             <a:endParaRPr lang="en-US"/>
           </a:p>
@@ -4294,7 +4293,7 @@
           <a:p>
             <a:fld id="{269BF7CC-1E9D-4749-A489-F0EE713BF271}" type="datetime1">
               <a:rPr lang="en-US" smtClean="0"/>
-              <a:t>7/30/2016</a:t>
+              <a:t>8/5/2016</a:t>
             </a:fld>
             <a:endParaRPr lang="en-US"/>
           </a:p>
@@ -4631,7 +4630,7 @@
           <a:p>
             <a:fld id="{0864D50F-913E-4917-9741-533E192353D0}" type="datetime1">
               <a:rPr lang="en-US" smtClean="0"/>
-              <a:t>7/30/2016</a:t>
+              <a:t>8/5/2016</a:t>
             </a:fld>
             <a:endParaRPr lang="en-US"/>
           </a:p>
@@ -5116,7 +5115,7 @@
           <a:p>
             <a:fld id="{D6FB155A-19E3-43DD-989B-03A4E4701F35}" type="datetime1">
               <a:rPr lang="en-US" smtClean="0"/>
-              <a:t>7/30/2016</a:t>
+              <a:t>8/5/2016</a:t>
             </a:fld>
             <a:endParaRPr lang="en-US"/>
           </a:p>
@@ -5283,7 +5282,7 @@
           <a:p>
             <a:fld id="{BC823B9E-5ED0-44CD-83B3-A2AB16D01544}" type="datetime1">
               <a:rPr lang="en-US" smtClean="0"/>
-              <a:t>7/30/2016</a:t>
+              <a:t>8/5/2016</a:t>
             </a:fld>
             <a:endParaRPr lang="en-US"/>
           </a:p>
@@ -5392,7 +5391,7 @@
           <a:p>
             <a:fld id="{9778D9D9-2A56-4484-B193-08C6BFC27EB5}" type="datetime1">
               <a:rPr lang="en-US" smtClean="0"/>
-              <a:t>7/30/2016</a:t>
+              <a:t>8/5/2016</a:t>
             </a:fld>
             <a:endParaRPr lang="en-US"/>
           </a:p>
@@ -5685,7 +5684,7 @@
           <a:p>
             <a:fld id="{C7AA5F0A-363B-4B86-8FF4-DBB39E1A7A8D}" type="datetime1">
               <a:rPr lang="en-US" smtClean="0"/>
-              <a:t>7/30/2016</a:t>
+              <a:t>8/5/2016</a:t>
             </a:fld>
             <a:endParaRPr lang="en-US"/>
           </a:p>
@@ -5997,7 +5996,7 @@
           <a:p>
             <a:fld id="{5E9F7874-C955-490E-B3E3-F284F53EAFD5}" type="datetime1">
               <a:rPr lang="en-US" smtClean="0"/>
-              <a:t>7/30/2016</a:t>
+              <a:t>8/5/2016</a:t>
             </a:fld>
             <a:endParaRPr lang="en-US"/>
           </a:p>
@@ -6302,7 +6301,7 @@
           <a:p>
             <a:fld id="{F0CB909F-036B-4509-8DBA-2E18816EFB3B}" type="datetime1">
               <a:rPr lang="en-US" smtClean="0"/>
-              <a:t>7/30/2016</a:t>
+              <a:t>8/5/2016</a:t>
             </a:fld>
             <a:endParaRPr lang="en-US" dirty="0"/>
           </a:p>
@@ -6842,7 +6841,7 @@
           <a:p>
             <a:fld id="{13642DF0-84EA-4327-A78E-3877B588F6B8}" type="datetime1">
               <a:rPr lang="en-US" smtClean="0"/>
-              <a:t>7/30/2016</a:t>
+              <a:t>8/5/2016</a:t>
             </a:fld>
             <a:endParaRPr lang="en-US"/>
           </a:p>
@@ -7293,15 +7292,7 @@
             <a:pPr algn="ctr"/>
             <a:r>
               <a:rPr lang="en-US" dirty="0" smtClean="0"/>
-              <a:t>August</a:t>
-            </a:r>
-            <a:r>
-              <a:rPr lang="en-US" dirty="0" smtClean="0"/>
-              <a:t>, </a:t>
-            </a:r>
-            <a:r>
-              <a:rPr lang="en-US" dirty="0" smtClean="0"/>
-              <a:t>2016</a:t>
+              <a:t>August 1, 2016</a:t>
             </a:r>
           </a:p>
           <a:p>
@@ -7388,51 +7379,7 @@
           <a:p>
             <a:r>
               <a:rPr lang="en-US" dirty="0" smtClean="0"/>
-              <a:t>Outline</a:t>
-            </a:r>
-            <a:endParaRPr lang="en-US" dirty="0"/>
-          </a:p>
-        </p:txBody>
-      </p:sp>
-      <p:sp>
-        <p:nvSpPr>
-          <p:cNvPr id="3" name="Content Placeholder 2"/>
-          <p:cNvSpPr>
-            <a:spLocks noGrp="1"/>
-          </p:cNvSpPr>
-          <p:nvPr>
-            <p:ph idx="1"/>
-          </p:nvPr>
-        </p:nvSpPr>
-        <p:spPr>
-          <a:xfrm>
-            <a:off x="457200" y="2133600"/>
-            <a:ext cx="8610600" cy="4343400"/>
-          </a:xfrm>
-        </p:spPr>
-        <p:txBody>
-          <a:bodyPr>
-            <a:normAutofit/>
-          </a:bodyPr>
-          <a:lstStyle/>
-          <a:p>
-            <a:r>
-              <a:rPr lang="en-US" dirty="0" smtClean="0"/>
-              <a:t>Project state</a:t>
-            </a:r>
-            <a:endParaRPr lang="en-US" dirty="0" smtClean="0"/>
-          </a:p>
-          <a:p>
-            <a:r>
-              <a:rPr lang="en-US" dirty="0" smtClean="0"/>
-              <a:t>Draft Process Map, ERs and ER matrix</a:t>
-            </a:r>
-            <a:endParaRPr lang="en-US" dirty="0" smtClean="0"/>
-          </a:p>
-          <a:p>
-            <a:r>
-              <a:rPr lang="en-US" dirty="0" smtClean="0"/>
-              <a:t>Work plan</a:t>
+              <a:t>Project Status Update</a:t>
             </a:r>
             <a:endParaRPr lang="en-US" dirty="0"/>
           </a:p>
@@ -7462,10 +7409,80 @@
           </a:p>
         </p:txBody>
       </p:sp>
+      <p:sp>
+        <p:nvSpPr>
+          <p:cNvPr id="6" name="Content Placeholder 1"/>
+          <p:cNvSpPr>
+            <a:spLocks noGrp="1"/>
+          </p:cNvSpPr>
+          <p:nvPr>
+            <p:ph idx="1"/>
+          </p:nvPr>
+        </p:nvSpPr>
+        <p:spPr>
+          <a:xfrm>
+            <a:off x="533400" y="1646562"/>
+            <a:ext cx="7886700" cy="3382638"/>
+          </a:xfrm>
+        </p:spPr>
+        <p:txBody>
+          <a:bodyPr>
+            <a:normAutofit/>
+          </a:bodyPr>
+          <a:lstStyle/>
+          <a:p>
+            <a:r>
+              <a:rPr lang="en-US" dirty="0" smtClean="0"/>
+              <a:t>Process maps:</a:t>
+            </a:r>
+          </a:p>
+          <a:p>
+            <a:pPr lvl="1"/>
+            <a:r>
+              <a:rPr lang="en-US" dirty="0" smtClean="0"/>
+              <a:t>Draft PM of sign - new construction/reconstruction</a:t>
+            </a:r>
+          </a:p>
+          <a:p>
+            <a:pPr lvl="1"/>
+            <a:r>
+              <a:rPr lang="en-US" dirty="0" smtClean="0"/>
+              <a:t>Draft PM of sign - replacement</a:t>
+            </a:r>
+          </a:p>
+          <a:p>
+            <a:pPr lvl="1"/>
+            <a:r>
+              <a:rPr lang="en-US" dirty="0" smtClean="0"/>
+              <a:t>Draft PM of sign - maintenance</a:t>
+            </a:r>
+          </a:p>
+          <a:p>
+            <a:r>
+              <a:rPr lang="en-US" dirty="0" smtClean="0"/>
+              <a:t>Exchange Requirements (ERs) and ER matrix</a:t>
+            </a:r>
+          </a:p>
+          <a:p>
+            <a:pPr lvl="1"/>
+            <a:r>
+              <a:rPr lang="en-US" dirty="0" smtClean="0"/>
+              <a:t>Draft ERs for seven identified exchange scenarios</a:t>
+            </a:r>
+          </a:p>
+          <a:p>
+            <a:pPr lvl="1"/>
+            <a:r>
+              <a:rPr lang="en-US" dirty="0" smtClean="0"/>
+              <a:t>Draft ER matrix</a:t>
+            </a:r>
+          </a:p>
+        </p:txBody>
+      </p:sp>
     </p:spTree>
     <p:extLst>
       <p:ext uri="{BB962C8B-B14F-4D97-AF65-F5344CB8AC3E}">
-        <p14:creationId xmlns:p14="http://schemas.microsoft.com/office/powerpoint/2010/main" val="1455488716"/>
+        <p14:creationId xmlns:p14="http://schemas.microsoft.com/office/powerpoint/2010/main" val="2699934423"/>
       </p:ext>
     </p:extLst>
   </p:cSld>
@@ -7509,163 +7526,6 @@
             <p:ph type="title"/>
           </p:nvPr>
         </p:nvSpPr>
-        <p:spPr/>
-        <p:txBody>
-          <a:bodyPr/>
-          <a:lstStyle/>
-          <a:p>
-            <a:r>
-              <a:rPr lang="en-US" dirty="0" smtClean="0"/>
-              <a:t>Project state</a:t>
-            </a:r>
-            <a:endParaRPr lang="en-US" dirty="0"/>
-          </a:p>
-        </p:txBody>
-      </p:sp>
-      <p:sp>
-        <p:nvSpPr>
-          <p:cNvPr id="4" name="Slide Number Placeholder 3"/>
-          <p:cNvSpPr>
-            <a:spLocks noGrp="1"/>
-          </p:cNvSpPr>
-          <p:nvPr>
-            <p:ph type="sldNum" sz="quarter" idx="12"/>
-          </p:nvPr>
-        </p:nvSpPr>
-        <p:spPr/>
-        <p:txBody>
-          <a:bodyPr/>
-          <a:lstStyle/>
-          <a:p>
-            <a:fld id="{E1362DB9-BBF4-4542-8AA6-209A733A7C0C}" type="slidenum">
-              <a:rPr lang="en-US" smtClean="0"/>
-              <a:pPr/>
-              <a:t>3</a:t>
-            </a:fld>
-            <a:endParaRPr lang="en-US" dirty="0"/>
-          </a:p>
-        </p:txBody>
-      </p:sp>
-      <p:sp>
-        <p:nvSpPr>
-          <p:cNvPr id="6" name="Content Placeholder 1"/>
-          <p:cNvSpPr>
-            <a:spLocks noGrp="1"/>
-          </p:cNvSpPr>
-          <p:nvPr>
-            <p:ph idx="1"/>
-          </p:nvPr>
-        </p:nvSpPr>
-        <p:spPr>
-          <a:xfrm>
-            <a:off x="533400" y="1646562"/>
-            <a:ext cx="7886700" cy="3382638"/>
-          </a:xfrm>
-        </p:spPr>
-        <p:txBody>
-          <a:bodyPr>
-            <a:normAutofit/>
-          </a:bodyPr>
-          <a:lstStyle/>
-          <a:p>
-            <a:r>
-              <a:rPr lang="en-US" dirty="0" smtClean="0"/>
-              <a:t>Process maps:</a:t>
-            </a:r>
-            <a:endParaRPr lang="en-US" dirty="0" smtClean="0"/>
-          </a:p>
-          <a:p>
-            <a:pPr lvl="1"/>
-            <a:r>
-              <a:rPr lang="en-US" dirty="0" smtClean="0"/>
-              <a:t>Draft PM of sign new construction/reconstruction</a:t>
-            </a:r>
-            <a:endParaRPr lang="en-US" dirty="0" smtClean="0"/>
-          </a:p>
-          <a:p>
-            <a:pPr lvl="1"/>
-            <a:r>
-              <a:rPr lang="en-US" dirty="0" smtClean="0"/>
-              <a:t>Draft PM of sign replacement</a:t>
-            </a:r>
-          </a:p>
-          <a:p>
-            <a:pPr lvl="1"/>
-            <a:r>
-              <a:rPr lang="en-US" dirty="0" smtClean="0"/>
-              <a:t>Draft PM of sign maintenance</a:t>
-            </a:r>
-          </a:p>
-          <a:p>
-            <a:r>
-              <a:rPr lang="en-US" dirty="0" smtClean="0"/>
-              <a:t>Exchange Requirements (ERs) and ER matrix</a:t>
-            </a:r>
-          </a:p>
-          <a:p>
-            <a:pPr lvl="1"/>
-            <a:r>
-              <a:rPr lang="en-US" dirty="0" smtClean="0"/>
-              <a:t>Draft ERs for 07 identified exchange scenarios</a:t>
-            </a:r>
-          </a:p>
-          <a:p>
-            <a:pPr lvl="1"/>
-            <a:r>
-              <a:rPr lang="en-US" dirty="0" smtClean="0"/>
-              <a:t>Draft ER matrix</a:t>
-            </a:r>
-            <a:endParaRPr lang="en-US" dirty="0" smtClean="0"/>
-          </a:p>
-        </p:txBody>
-      </p:sp>
-    </p:spTree>
-    <p:extLst>
-      <p:ext uri="{BB962C8B-B14F-4D97-AF65-F5344CB8AC3E}">
-        <p14:creationId xmlns:p14="http://schemas.microsoft.com/office/powerpoint/2010/main" val="2699934423"/>
-      </p:ext>
-    </p:extLst>
-  </p:cSld>
-  <p:clrMapOvr>
-    <a:masterClrMapping/>
-  </p:clrMapOvr>
-  <p:timing>
-    <p:tnLst>
-      <p:par>
-        <p:cTn id="1" dur="indefinite" restart="never" nodeType="tmRoot"/>
-      </p:par>
-    </p:tnLst>
-  </p:timing>
-</p:sld>
-</file>
-
-<file path=ppt/slides/slide4.xml><?xml version="1.0" encoding="utf-8"?>
-<p:sld xmlns:a="http://schemas.openxmlformats.org/drawingml/2006/main" xmlns:r="http://schemas.openxmlformats.org/officeDocument/2006/relationships" xmlns:p="http://schemas.openxmlformats.org/presentationml/2006/main">
-  <p:cSld>
-    <p:spTree>
-      <p:nvGrpSpPr>
-        <p:cNvPr id="1" name=""/>
-        <p:cNvGrpSpPr/>
-        <p:nvPr/>
-      </p:nvGrpSpPr>
-      <p:grpSpPr>
-        <a:xfrm>
-          <a:off x="0" y="0"/>
-          <a:ext cx="0" cy="0"/>
-          <a:chOff x="0" y="0"/>
-          <a:chExt cx="0" cy="0"/>
-        </a:xfrm>
-      </p:grpSpPr>
-      <p:sp>
-        <p:nvSpPr>
-          <p:cNvPr id="2" name="Title 1"/>
-          <p:cNvSpPr>
-            <a:spLocks noGrp="1"/>
-          </p:cNvSpPr>
-          <p:nvPr>
-            <p:ph type="title"/>
-          </p:nvPr>
-        </p:nvSpPr>
         <p:spPr>
           <a:xfrm>
             <a:off x="438150" y="71738"/>
@@ -7732,7 +7592,7 @@
             <a:fld id="{E1362DB9-BBF4-4542-8AA6-209A733A7C0C}" type="slidenum">
               <a:rPr lang="en-US" smtClean="0"/>
               <a:pPr/>
-              <a:t>4</a:t>
+              <a:t>3</a:t>
             </a:fld>
             <a:endParaRPr lang="en-US" dirty="0"/>
           </a:p>
@@ -7836,11 +7696,7 @@
               <a:pPr algn="ctr"/>
               <a:r>
                 <a:rPr lang="en-US" dirty="0" smtClean="0"/>
-                <a:t>P</a:t>
-              </a:r>
-              <a:r>
-                <a:rPr lang="en-US" dirty="0" smtClean="0"/>
-                <a:t>hase</a:t>
+                <a:t>Phase</a:t>
               </a:r>
               <a:endParaRPr lang="en-US" dirty="0"/>
             </a:p>
@@ -8171,11 +8027,7 @@
               <a:pPr algn="ctr"/>
               <a:r>
                 <a:rPr lang="en-US" dirty="0" smtClean="0"/>
-                <a:t>A</a:t>
-              </a:r>
-              <a:r>
-                <a:rPr lang="en-US" dirty="0" smtClean="0"/>
-                <a:t>ctor</a:t>
+                <a:t>Actor</a:t>
               </a:r>
               <a:endParaRPr lang="en-US" dirty="0"/>
             </a:p>
@@ -8355,7 +8207,7 @@
 </p:sld>
 </file>
 
-<file path=ppt/slides/slide5.xml><?xml version="1.0" encoding="utf-8"?>
+<file path=ppt/slides/slide4.xml><?xml version="1.0" encoding="utf-8"?>
 <p:sld xmlns:a="http://schemas.openxmlformats.org/drawingml/2006/main" xmlns:r="http://schemas.openxmlformats.org/officeDocument/2006/relationships" xmlns:p="http://schemas.openxmlformats.org/presentationml/2006/main">
   <p:cSld>
     <p:spTree>
@@ -8807,7 +8659,7 @@
 </p:sld>
 </file>
 
-<file path=ppt/slides/slide6.xml><?xml version="1.0" encoding="utf-8"?>
+<file path=ppt/slides/slide5.xml><?xml version="1.0" encoding="utf-8"?>
 <p:sld xmlns:a="http://schemas.openxmlformats.org/drawingml/2006/main" xmlns:r="http://schemas.openxmlformats.org/officeDocument/2006/relationships" xmlns:p="http://schemas.openxmlformats.org/presentationml/2006/main">
   <p:cSld>
     <p:spTree>
@@ -8966,7 +8818,7 @@
 </p:sld>
 </file>
 
-<file path=ppt/slides/slide7.xml><?xml version="1.0" encoding="utf-8"?>
+<file path=ppt/slides/slide6.xml><?xml version="1.0" encoding="utf-8"?>
 <p:sld xmlns:a="http://schemas.openxmlformats.org/drawingml/2006/main" xmlns:r="http://schemas.openxmlformats.org/officeDocument/2006/relationships" xmlns:p="http://schemas.openxmlformats.org/presentationml/2006/main">
   <p:cSld>
     <p:spTree>
@@ -9024,7 +8876,7 @@
             <a:fld id="{E1362DB9-BBF4-4542-8AA6-209A733A7C0C}" type="slidenum">
               <a:rPr lang="en-US" smtClean="0"/>
               <a:pPr/>
-              <a:t>7</a:t>
+              <a:t>6</a:t>
             </a:fld>
             <a:endParaRPr lang="en-US" dirty="0"/>
           </a:p>
@@ -9054,13 +8906,13 @@
           <a:p>
             <a:r>
               <a:rPr lang="en-US" dirty="0" smtClean="0"/>
-              <a:t>Revise PM, ERs and ER matrix based on feedback from Iowa DOT</a:t>
+              <a:t>Revise PMs, ERs and ER matrix based on feedback from Iowa DOT</a:t>
             </a:r>
           </a:p>
           <a:p>
             <a:r>
               <a:rPr lang="en-US" dirty="0" smtClean="0"/>
-              <a:t>Develop preliminary process map for guardrails</a:t>
+              <a:t>Develop preliminary process maps for guardrails</a:t>
             </a:r>
           </a:p>
           <a:p>
@@ -9068,7 +8920,6 @@
               <a:rPr lang="en-US" dirty="0" smtClean="0"/>
               <a:t>Schedule individual meetings for guardrails</a:t>
             </a:r>
-            <a:endParaRPr lang="en-US" dirty="0" smtClean="0"/>
           </a:p>
         </p:txBody>
       </p:sp>

</xml_diff>